<commit_message>
fix presentation and project book
</commit_message>
<xml_diff>
--- a/Documents/מצגת פרויקט.pptx
+++ b/Documents/מצגת פרויקט.pptx
@@ -10154,7 +10154,7 @@
           <a:p>
             <a:fld id="{4929A4FD-FAFB-4CDA-9DC5-D20CA18269A9}" type="datetimeFigureOut">
               <a:rPr lang="en-US" smtClean="0"/>
-              <a:t>6/19/2019</a:t>
+              <a:t>6/20/2019</a:t>
             </a:fld>
             <a:endParaRPr lang="en-US" dirty="0"/>
           </a:p>
@@ -10331,7 +10331,7 @@
           <a:p>
             <a:fld id="{CB91E35E-F34C-4F0E-B8A1-D9F5F49CB3AD}" type="datetimeFigureOut">
               <a:rPr lang="en-US" smtClean="0"/>
-              <a:t>6/19/2019</a:t>
+              <a:t>6/20/2019</a:t>
             </a:fld>
             <a:endParaRPr lang="en-US" dirty="0"/>
           </a:p>
@@ -11348,7 +11348,7 @@
             <a:fld id="{B61BEF0D-F0BB-DE4B-95CE-6DB70DBA9567}" type="datetimeFigureOut">
               <a:rPr lang="en-US" smtClean="0"/>
               <a:pPr/>
-              <a:t>6/19/2019</a:t>
+              <a:t>6/20/2019</a:t>
             </a:fld>
             <a:endParaRPr lang="en-US" dirty="0"/>
           </a:p>
@@ -11612,7 +11612,7 @@
             <a:fld id="{B61BEF0D-F0BB-DE4B-95CE-6DB70DBA9567}" type="datetimeFigureOut">
               <a:rPr lang="en-US" smtClean="0"/>
               <a:pPr/>
-              <a:t>6/19/2019</a:t>
+              <a:t>6/20/2019</a:t>
             </a:fld>
             <a:endParaRPr lang="en-US" dirty="0"/>
           </a:p>
@@ -11849,7 +11849,7 @@
             <a:fld id="{B61BEF0D-F0BB-DE4B-95CE-6DB70DBA9567}" type="datetimeFigureOut">
               <a:rPr lang="en-US" smtClean="0"/>
               <a:pPr/>
-              <a:t>6/19/2019</a:t>
+              <a:t>6/20/2019</a:t>
             </a:fld>
             <a:endParaRPr lang="en-US" dirty="0"/>
           </a:p>
@@ -12091,7 +12091,7 @@
             <a:fld id="{B61BEF0D-F0BB-DE4B-95CE-6DB70DBA9567}" type="datetimeFigureOut">
               <a:rPr lang="en-US" smtClean="0"/>
               <a:pPr/>
-              <a:t>6/19/2019</a:t>
+              <a:t>6/20/2019</a:t>
             </a:fld>
             <a:endParaRPr lang="en-US" dirty="0"/>
           </a:p>
@@ -12400,7 +12400,7 @@
             <a:fld id="{B61BEF0D-F0BB-DE4B-95CE-6DB70DBA9567}" type="datetimeFigureOut">
               <a:rPr lang="en-US" smtClean="0"/>
               <a:pPr/>
-              <a:t>6/19/2019</a:t>
+              <a:t>6/20/2019</a:t>
             </a:fld>
             <a:endParaRPr lang="en-US" dirty="0"/>
           </a:p>
@@ -12704,7 +12704,7 @@
             <a:fld id="{B61BEF0D-F0BB-DE4B-95CE-6DB70DBA9567}" type="datetimeFigureOut">
               <a:rPr lang="en-US" smtClean="0"/>
               <a:pPr/>
-              <a:t>6/19/2019</a:t>
+              <a:t>6/20/2019</a:t>
             </a:fld>
             <a:endParaRPr lang="en-US" dirty="0"/>
           </a:p>
@@ -13128,7 +13128,7 @@
             <a:fld id="{B61BEF0D-F0BB-DE4B-95CE-6DB70DBA9567}" type="datetimeFigureOut">
               <a:rPr lang="en-US" smtClean="0"/>
               <a:pPr/>
-              <a:t>6/19/2019</a:t>
+              <a:t>6/20/2019</a:t>
             </a:fld>
             <a:endParaRPr lang="en-US" dirty="0"/>
           </a:p>
@@ -13225,7 +13225,7 @@
             <a:fld id="{B61BEF0D-F0BB-DE4B-95CE-6DB70DBA9567}" type="datetimeFigureOut">
               <a:rPr lang="en-US" smtClean="0"/>
               <a:pPr/>
-              <a:t>6/19/2019</a:t>
+              <a:t>6/20/2019</a:t>
             </a:fld>
             <a:endParaRPr lang="en-US" dirty="0"/>
           </a:p>
@@ -13389,7 +13389,7 @@
             <a:fld id="{B61BEF0D-F0BB-DE4B-95CE-6DB70DBA9567}" type="datetimeFigureOut">
               <a:rPr lang="en-US" smtClean="0"/>
               <a:pPr/>
-              <a:t>6/19/2019</a:t>
+              <a:t>6/20/2019</a:t>
             </a:fld>
             <a:endParaRPr lang="en-US" dirty="0"/>
           </a:p>
@@ -13769,7 +13769,7 @@
             <a:fld id="{B61BEF0D-F0BB-DE4B-95CE-6DB70DBA9567}" type="datetimeFigureOut">
               <a:rPr lang="en-US" smtClean="0"/>
               <a:pPr/>
-              <a:t>6/19/2019</a:t>
+              <a:t>6/20/2019</a:t>
             </a:fld>
             <a:endParaRPr lang="en-US" dirty="0"/>
           </a:p>
@@ -14060,7 +14060,7 @@
             <a:fld id="{B61BEF0D-F0BB-DE4B-95CE-6DB70DBA9567}" type="datetimeFigureOut">
               <a:rPr lang="en-US" smtClean="0"/>
               <a:pPr/>
-              <a:t>6/19/2019</a:t>
+              <a:t>6/20/2019</a:t>
             </a:fld>
             <a:endParaRPr lang="en-US" dirty="0"/>
           </a:p>
@@ -14273,7 +14273,7 @@
             <a:fld id="{B61BEF0D-F0BB-DE4B-95CE-6DB70DBA9567}" type="datetimeFigureOut">
               <a:rPr lang="en-US" smtClean="0"/>
               <a:pPr/>
-              <a:t>6/19/2019</a:t>
+              <a:t>6/20/2019</a:t>
             </a:fld>
             <a:endParaRPr lang="en-US" dirty="0"/>
           </a:p>
@@ -15790,10 +15790,10 @@
       </p:sp>
       <p:pic>
         <p:nvPicPr>
-          <p:cNvPr id="5" name="Picture 4">
+          <p:cNvPr id="4" name="Picture 3">
             <a:extLst>
               <a:ext uri="{FF2B5EF4-FFF2-40B4-BE49-F238E27FC236}">
-                <a16:creationId xmlns:a16="http://schemas.microsoft.com/office/drawing/2014/main" id="{CD50892C-F278-4DC7-B975-98DBA4BAFD7E}"/>
+                <a16:creationId xmlns:a16="http://schemas.microsoft.com/office/drawing/2014/main" id="{DC53AE89-6CD5-4436-9E73-238AA6BAAAC4}"/>
               </a:ext>
             </a:extLst>
           </p:cNvPr>
@@ -15810,8 +15810,8 @@
         </p:blipFill>
         <p:spPr>
           <a:xfrm>
-            <a:off x="2893433" y="1906077"/>
-            <a:ext cx="6405133" cy="4872280"/>
+            <a:off x="2941680" y="1901220"/>
+            <a:ext cx="6308640" cy="4813497"/>
           </a:xfrm>
           <a:prstGeom prst="rect">
             <a:avLst/>
@@ -16230,14 +16230,14 @@
           <p:nvPr>
             <p:extLst>
               <p:ext uri="{D42A27DB-BD31-4B8C-83A1-F6EECF244321}">
-                <p14:modId xmlns:p14="http://schemas.microsoft.com/office/powerpoint/2010/main" val="3119015993"/>
+                <p14:modId xmlns:p14="http://schemas.microsoft.com/office/powerpoint/2010/main" val="1503045801"/>
               </p:ext>
             </p:extLst>
           </p:nvPr>
         </p:nvGraphicFramePr>
         <p:xfrm>
           <a:off x="451681" y="2820596"/>
-          <a:ext cx="6641583" cy="3913404"/>
+          <a:ext cx="6605705" cy="3913404"/>
         </p:xfrm>
         <a:graphic>
           <a:graphicData uri="http://schemas.openxmlformats.org/drawingml/2006/table">
@@ -16246,7 +16246,7 @@
                 <a:tableStyleId>{5C22544A-7EE6-4342-B048-85BDC9FD1C3A}</a:tableStyleId>
               </a:tblPr>
               <a:tblGrid>
-                <a:gridCol w="1664872">
+                <a:gridCol w="1628994">
                   <a:extLst>
                     <a:ext uri="{9D8B030D-6E8A-4147-A177-3AD203B41FA5}">
                       <a16:colId xmlns:a16="http://schemas.microsoft.com/office/drawing/2014/main" val="2816686748"/>
@@ -16309,7 +16309,7 @@
                           <a:latin typeface="Segoe UI Light" panose="020B0502040204020203" pitchFamily="34" charset="0"/>
                           <a:cs typeface="Segoe UI Light" panose="020B0502040204020203" pitchFamily="34" charset="0"/>
                         </a:rPr>
-                        <a:t># run\ exec time</a:t>
+                        <a:t># run\ # players</a:t>
                       </a:r>
                       <a:endParaRPr lang="en-US" sz="1800" b="1" i="0" u="none" strike="noStrike" dirty="0">
                         <a:solidFill>
@@ -18789,14 +18789,14 @@
           <p:nvPr>
             <p:extLst>
               <p:ext uri="{D42A27DB-BD31-4B8C-83A1-F6EECF244321}">
-                <p14:modId xmlns:p14="http://schemas.microsoft.com/office/powerpoint/2010/main" val="260220920"/>
+                <p14:modId xmlns:p14="http://schemas.microsoft.com/office/powerpoint/2010/main" val="2090905728"/>
               </p:ext>
             </p:extLst>
           </p:nvPr>
         </p:nvGraphicFramePr>
         <p:xfrm>
           <a:off x="451681" y="2820596"/>
-          <a:ext cx="6645280" cy="3913404"/>
+          <a:ext cx="6609402" cy="3913404"/>
         </p:xfrm>
         <a:graphic>
           <a:graphicData uri="http://schemas.openxmlformats.org/drawingml/2006/table">
@@ -18805,7 +18805,7 @@
                 <a:tableStyleId>{5C22544A-7EE6-4342-B048-85BDC9FD1C3A}</a:tableStyleId>
               </a:tblPr>
               <a:tblGrid>
-                <a:gridCol w="1658938">
+                <a:gridCol w="1623060">
                   <a:extLst>
                     <a:ext uri="{9D8B030D-6E8A-4147-A177-3AD203B41FA5}">
                       <a16:colId xmlns:a16="http://schemas.microsoft.com/office/drawing/2014/main" val="2816686748"/>
@@ -18871,7 +18871,7 @@
                           <a:latin typeface="Segoe UI Light" panose="020B0502040204020203" pitchFamily="34" charset="0"/>
                           <a:cs typeface="Segoe UI Light" panose="020B0502040204020203" pitchFamily="34" charset="0"/>
                         </a:rPr>
-                        <a:t># run\ exec time</a:t>
+                        <a:t># run\ # players</a:t>
                       </a:r>
                     </a:p>
                   </a:txBody>
@@ -23362,7 +23362,7 @@
           <p:nvPr>
             <p:extLst>
               <p:ext uri="{D42A27DB-BD31-4B8C-83A1-F6EECF244321}">
-                <p14:modId xmlns:p14="http://schemas.microsoft.com/office/powerpoint/2010/main" val="623592384"/>
+                <p14:modId xmlns:p14="http://schemas.microsoft.com/office/powerpoint/2010/main" val="4006600947"/>
               </p:ext>
             </p:extLst>
           </p:nvPr>
@@ -23590,7 +23590,7 @@
                     <a:p>
                       <a:pPr algn="l" fontAlgn="b"/>
                       <a:r>
-                        <a:rPr lang="he-IL" sz="1800" b="0" i="0" u="none" strike="noStrike">
+                        <a:rPr lang="he-IL" sz="1800" b="1" i="0" u="none" strike="noStrike" dirty="0">
                           <a:solidFill>
                             <a:srgbClr val="000000"/>
                           </a:solidFill>
@@ -23744,7 +23744,7 @@
                     <a:p>
                       <a:pPr algn="l" fontAlgn="b"/>
                       <a:r>
-                        <a:rPr lang="he-IL" sz="1800" b="0" i="0" u="none" strike="noStrike">
+                        <a:rPr lang="he-IL" sz="1800" b="1" i="0" u="none" strike="noStrike">
                           <a:solidFill>
                             <a:srgbClr val="000000"/>
                           </a:solidFill>
@@ -23898,7 +23898,7 @@
                     <a:p>
                       <a:pPr algn="l" fontAlgn="b"/>
                       <a:r>
-                        <a:rPr lang="he-IL" sz="1800" b="0" i="0" u="none" strike="noStrike">
+                        <a:rPr lang="he-IL" sz="1800" b="1" i="0" u="none" strike="noStrike">
                           <a:solidFill>
                             <a:srgbClr val="000000"/>
                           </a:solidFill>
@@ -24052,7 +24052,7 @@
                     <a:p>
                       <a:pPr algn="l" fontAlgn="b"/>
                       <a:r>
-                        <a:rPr lang="he-IL" sz="1800" b="0" i="0" u="none" strike="noStrike">
+                        <a:rPr lang="he-IL" sz="1800" b="1" i="0" u="none" strike="noStrike">
                           <a:solidFill>
                             <a:srgbClr val="000000"/>
                           </a:solidFill>
@@ -24206,7 +24206,7 @@
                     <a:p>
                       <a:pPr algn="l" fontAlgn="b"/>
                       <a:r>
-                        <a:rPr lang="he-IL" sz="1800" b="0" i="0" u="none" strike="noStrike">
+                        <a:rPr lang="he-IL" sz="1800" b="1" i="0" u="none" strike="noStrike">
                           <a:solidFill>
                             <a:srgbClr val="000000"/>
                           </a:solidFill>
@@ -24360,7 +24360,7 @@
                     <a:p>
                       <a:pPr algn="l" fontAlgn="b"/>
                       <a:r>
-                        <a:rPr lang="he-IL" sz="1800" b="0" i="0" u="none" strike="noStrike">
+                        <a:rPr lang="he-IL" sz="1800" b="1" i="0" u="none" strike="noStrike">
                           <a:solidFill>
                             <a:srgbClr val="000000"/>
                           </a:solidFill>
@@ -24514,7 +24514,7 @@
                     <a:p>
                       <a:pPr algn="l" fontAlgn="b"/>
                       <a:r>
-                        <a:rPr lang="he-IL" sz="1800" b="0" i="0" u="none" strike="noStrike">
+                        <a:rPr lang="he-IL" sz="1800" b="1" i="0" u="none" strike="noStrike">
                           <a:solidFill>
                             <a:srgbClr val="000000"/>
                           </a:solidFill>
@@ -24668,7 +24668,7 @@
                     <a:p>
                       <a:pPr algn="l" fontAlgn="b"/>
                       <a:r>
-                        <a:rPr lang="he-IL" sz="1800" b="0" i="0" u="none" strike="noStrike">
+                        <a:rPr lang="he-IL" sz="1800" b="1" i="0" u="none" strike="noStrike" dirty="0">
                           <a:solidFill>
                             <a:srgbClr val="000000"/>
                           </a:solidFill>
@@ -24822,7 +24822,7 @@
                     <a:p>
                       <a:pPr algn="l" fontAlgn="b"/>
                       <a:r>
-                        <a:rPr lang="he-IL" sz="1800" b="0" i="0" u="none" strike="noStrike">
+                        <a:rPr lang="he-IL" sz="1800" b="1" i="0" u="none" strike="noStrike">
                           <a:solidFill>
                             <a:srgbClr val="000000"/>
                           </a:solidFill>
@@ -24976,7 +24976,7 @@
                     <a:p>
                       <a:pPr algn="l" fontAlgn="b"/>
                       <a:r>
-                        <a:rPr lang="he-IL" sz="1800" b="0" i="0" u="none" strike="noStrike">
+                        <a:rPr lang="he-IL" sz="1800" b="1" i="0" u="none" strike="noStrike">
                           <a:solidFill>
                             <a:srgbClr val="000000"/>
                           </a:solidFill>
@@ -25130,7 +25130,7 @@
                     <a:p>
                       <a:pPr algn="l" fontAlgn="b"/>
                       <a:r>
-                        <a:rPr lang="en-US" sz="1800" b="0" i="0" u="none" strike="noStrike">
+                        <a:rPr lang="en-US" sz="1800" b="1" i="0" u="none" strike="noStrike" dirty="0">
                           <a:solidFill>
                             <a:srgbClr val="000000"/>
                           </a:solidFill>

</xml_diff>